<commit_message>
Tercera subida correcion unidad 2 sprint 8
</commit_message>
<xml_diff>
--- a/Challenge Unidad 2 Sprint 08 - presentacion.pptx
+++ b/Challenge Unidad 2 Sprint 08 - presentacion.pptx
@@ -8,10 +8,9 @@
     <p:sldId id="256" r:id="rId2"/>
     <p:sldId id="257" r:id="rId3"/>
     <p:sldId id="258" r:id="rId4"/>
-    <p:sldId id="259" r:id="rId5"/>
-    <p:sldId id="260" r:id="rId6"/>
-    <p:sldId id="262" r:id="rId7"/>
-    <p:sldId id="264" r:id="rId8"/>
+    <p:sldId id="260" r:id="rId5"/>
+    <p:sldId id="262" r:id="rId6"/>
+    <p:sldId id="264" r:id="rId7"/>
   </p:sldIdLst>
   <p:sldSz cx="9144000" cy="6858000" type="screen4x3"/>
   <p:notesSz cx="6858000" cy="9144000"/>
@@ -110,6 +109,11 @@
       </a:defRPr>
     </a:lvl9pPr>
   </p:defaultTextStyle>
+  <p:extLst>
+    <p:ext uri="{EFAFB233-063F-42B5-8137-9DF3F51BA10A}">
+      <p15:sldGuideLst xmlns:p15="http://schemas.microsoft.com/office/powerpoint/2012/main"/>
+    </p:ext>
+  </p:extLst>
 </p:presentation>
 </file>
 
@@ -3469,224 +3473,6 @@
           <a:p>
             <a:r>
               <a:rPr lang="es-ES" sz="1400" dirty="0"/>
-              <a:t> Segmentación por grupo poblacional</a:t>
-            </a:r>
-          </a:p>
-        </p:txBody>
-      </p:sp>
-      <p:sp>
-        <p:nvSpPr>
-          <p:cNvPr id="7" name="TextBox 6">
-            <a:extLst>
-              <a:ext uri="{FF2B5EF4-FFF2-40B4-BE49-F238E27FC236}">
-                <a16:creationId xmlns:a16="http://schemas.microsoft.com/office/drawing/2014/main" id="{E1A4B79A-2D88-4915-8019-575A75B6E19E}"/>
-              </a:ext>
-            </a:extLst>
-          </p:cNvPr>
-          <p:cNvSpPr txBox="1"/>
-          <p:nvPr/>
-        </p:nvSpPr>
-        <p:spPr>
-          <a:xfrm>
-            <a:off x="276897" y="1888079"/>
-            <a:ext cx="2900966" cy="3416320"/>
-          </a:xfrm>
-          <a:prstGeom prst="rect">
-            <a:avLst/>
-          </a:prstGeom>
-          <a:noFill/>
-        </p:spPr>
-        <p:txBody>
-          <a:bodyPr wrap="square" rtlCol="0">
-            <a:spAutoFit/>
-          </a:bodyPr>
-          <a:lstStyle/>
-          <a:p>
-            <a:pPr marL="285750" indent="-285750">
-              <a:buFont typeface="Arial" panose="020B0604020202020204" pitchFamily="34" charset="0"/>
-              <a:buChar char="•"/>
-            </a:pPr>
-            <a:r>
-              <a:rPr lang="es-ES" dirty="0"/>
-              <a:t>Por cuestiones demográficas, se pueden distinguir tres grupos poblacionales:</a:t>
-            </a:r>
-          </a:p>
-          <a:p>
-            <a:pPr marL="285750" indent="-285750">
-              <a:buFont typeface="Arial" panose="020B0604020202020204" pitchFamily="34" charset="0"/>
-              <a:buChar char="•"/>
-            </a:pPr>
-            <a:endParaRPr lang="es-ES" dirty="0"/>
-          </a:p>
-          <a:p>
-            <a:pPr marL="742950" lvl="1" indent="-285750">
-              <a:buFont typeface="Arial" panose="020B0604020202020204" pitchFamily="34" charset="0"/>
-              <a:buChar char="•"/>
-            </a:pPr>
-            <a:r>
-              <a:rPr lang="es-ES" dirty="0"/>
-              <a:t>Hombres (</a:t>
-            </a:r>
-            <a:r>
-              <a:rPr lang="es-ES" dirty="0" err="1"/>
-              <a:t>man</a:t>
-            </a:r>
-            <a:r>
-              <a:rPr lang="es-ES" dirty="0"/>
-              <a:t>)</a:t>
-            </a:r>
-          </a:p>
-          <a:p>
-            <a:pPr marL="742950" lvl="1" indent="-285750">
-              <a:buFont typeface="Arial" panose="020B0604020202020204" pitchFamily="34" charset="0"/>
-              <a:buChar char="•"/>
-            </a:pPr>
-            <a:r>
-              <a:rPr lang="es-ES" dirty="0"/>
-              <a:t>Mujeres (</a:t>
-            </a:r>
-            <a:r>
-              <a:rPr lang="es-ES" dirty="0" err="1"/>
-              <a:t>woman</a:t>
-            </a:r>
-            <a:r>
-              <a:rPr lang="es-ES" dirty="0"/>
-              <a:t>)</a:t>
-            </a:r>
-          </a:p>
-          <a:p>
-            <a:pPr marL="742950" lvl="1" indent="-285750">
-              <a:buFont typeface="Arial" panose="020B0604020202020204" pitchFamily="34" charset="0"/>
-              <a:buChar char="•"/>
-            </a:pPr>
-            <a:r>
-              <a:rPr lang="es-ES" dirty="0"/>
-              <a:t>Niños (</a:t>
-            </a:r>
-            <a:r>
-              <a:rPr lang="es-ES" dirty="0" err="1"/>
-              <a:t>child</a:t>
-            </a:r>
-            <a:r>
-              <a:rPr lang="es-ES" dirty="0"/>
-              <a:t>)</a:t>
-            </a:r>
-          </a:p>
-          <a:p>
-            <a:pPr marL="742950" lvl="1" indent="-285750">
-              <a:buFont typeface="Arial" panose="020B0604020202020204" pitchFamily="34" charset="0"/>
-              <a:buChar char="•"/>
-            </a:pPr>
-            <a:endParaRPr lang="es-ES" dirty="0"/>
-          </a:p>
-          <a:p>
-            <a:pPr marL="285750" indent="-285750">
-              <a:buFont typeface="Arial" panose="020B0604020202020204" pitchFamily="34" charset="0"/>
-              <a:buChar char="•"/>
-            </a:pPr>
-            <a:r>
-              <a:rPr lang="es-ES" dirty="0"/>
-              <a:t>La tasa de supervivencia es distinta en cada uno de ellos</a:t>
-            </a:r>
-          </a:p>
-        </p:txBody>
-      </p:sp>
-      <p:pic>
-        <p:nvPicPr>
-          <p:cNvPr id="8" name="Picture 7">
-            <a:extLst>
-              <a:ext uri="{FF2B5EF4-FFF2-40B4-BE49-F238E27FC236}">
-                <a16:creationId xmlns:a16="http://schemas.microsoft.com/office/drawing/2014/main" id="{42403B6B-3B65-4E12-BD06-D99890B43428}"/>
-              </a:ext>
-            </a:extLst>
-          </p:cNvPr>
-          <p:cNvPicPr>
-            <a:picLocks noChangeAspect="1"/>
-          </p:cNvPicPr>
-          <p:nvPr/>
-        </p:nvPicPr>
-        <p:blipFill>
-          <a:blip r:embed="rId2"/>
-          <a:stretch>
-            <a:fillRect/>
-          </a:stretch>
-        </p:blipFill>
-        <p:spPr>
-          <a:xfrm>
-            <a:off x="3741314" y="1600626"/>
-            <a:ext cx="4978648" cy="3714229"/>
-          </a:xfrm>
-          <a:prstGeom prst="rect">
-            <a:avLst/>
-          </a:prstGeom>
-        </p:spPr>
-      </p:pic>
-    </p:spTree>
-    <p:extLst>
-      <p:ext uri="{BB962C8B-B14F-4D97-AF65-F5344CB8AC3E}">
-        <p14:creationId xmlns:p14="http://schemas.microsoft.com/office/powerpoint/2010/main" val="3386418046"/>
-      </p:ext>
-    </p:extLst>
-  </p:cSld>
-  <p:clrMapOvr>
-    <a:masterClrMapping/>
-  </p:clrMapOvr>
-</p:sld>
-</file>
-
-<file path=ppt/slides/slide5.xml><?xml version="1.0" encoding="utf-8"?>
-<p:sld xmlns:a="http://schemas.openxmlformats.org/drawingml/2006/main" xmlns:r="http://schemas.openxmlformats.org/officeDocument/2006/relationships" xmlns:p="http://schemas.openxmlformats.org/presentationml/2006/main">
-  <p:cSld>
-    <p:spTree>
-      <p:nvGrpSpPr>
-        <p:cNvPr id="1" name=""/>
-        <p:cNvGrpSpPr/>
-        <p:nvPr/>
-      </p:nvGrpSpPr>
-      <p:grpSpPr>
-        <a:xfrm>
-          <a:off x="0" y="0"/>
-          <a:ext cx="0" cy="0"/>
-          <a:chOff x="0" y="0"/>
-          <a:chExt cx="0" cy="0"/>
-        </a:xfrm>
-      </p:grpSpPr>
-      <p:sp>
-        <p:nvSpPr>
-          <p:cNvPr id="6" name="TextBox 5">
-            <a:extLst>
-              <a:ext uri="{FF2B5EF4-FFF2-40B4-BE49-F238E27FC236}">
-                <a16:creationId xmlns:a16="http://schemas.microsoft.com/office/drawing/2014/main" id="{ED0C9EC6-50D9-49A9-8CB3-A3E757CA2802}"/>
-              </a:ext>
-            </a:extLst>
-          </p:cNvPr>
-          <p:cNvSpPr txBox="1"/>
-          <p:nvPr/>
-        </p:nvSpPr>
-        <p:spPr>
-          <a:xfrm>
-            <a:off x="540913" y="534473"/>
-            <a:ext cx="7514822" cy="738664"/>
-          </a:xfrm>
-          <a:prstGeom prst="rect">
-            <a:avLst/>
-          </a:prstGeom>
-          <a:noFill/>
-        </p:spPr>
-        <p:txBody>
-          <a:bodyPr wrap="square" rtlCol="0">
-            <a:spAutoFit/>
-          </a:bodyPr>
-          <a:lstStyle/>
-          <a:p>
-            <a:r>
-              <a:rPr lang="es-ES" sz="2800" dirty="0"/>
-              <a:t>Tasa de mortalidad</a:t>
-            </a:r>
-          </a:p>
-          <a:p>
-            <a:r>
-              <a:rPr lang="es-ES" sz="1400" dirty="0"/>
               <a:t> Segmentación por clase social</a:t>
             </a:r>
           </a:p>
@@ -3840,7 +3626,7 @@
 </p:sld>
 </file>
 
-<file path=ppt/slides/slide6.xml><?xml version="1.0" encoding="utf-8"?>
+<file path=ppt/slides/slide5.xml><?xml version="1.0" encoding="utf-8"?>
 <p:sld xmlns:a="http://schemas.openxmlformats.org/drawingml/2006/main" xmlns:r="http://schemas.openxmlformats.org/officeDocument/2006/relationships" xmlns:p="http://schemas.openxmlformats.org/presentationml/2006/main">
   <p:cSld>
     <p:spTree>
@@ -4004,7 +3790,7 @@
 </p:sld>
 </file>
 
-<file path=ppt/slides/slide7.xml><?xml version="1.0" encoding="utf-8"?>
+<file path=ppt/slides/slide6.xml><?xml version="1.0" encoding="utf-8"?>
 <p:sld xmlns:a="http://schemas.openxmlformats.org/drawingml/2006/main" xmlns:r="http://schemas.openxmlformats.org/officeDocument/2006/relationships" xmlns:p="http://schemas.openxmlformats.org/presentationml/2006/main">
   <p:cSld>
     <p:spTree>

</xml_diff>